<commit_message>
Primera version del notebook de Classificacion_LogReg
</commit_message>
<xml_diff>
--- a/C2.Classification_LogReg/figs/Figs.pptx
+++ b/C2.Classification_LogReg/figs/Figs.pptx
@@ -5,8 +5,7 @@
     <p:sldMasterId id="2147483648" r:id="rId1"/>
   </p:sldMasterIdLst>
   <p:sldIdLst>
-    <p:sldId id="256" r:id="rId2"/>
-    <p:sldId id="257" r:id="rId3"/>
+    <p:sldId id="257" r:id="rId2"/>
   </p:sldIdLst>
   <p:sldSz cx="12192000" cy="6858000"/>
   <p:notesSz cx="6858000" cy="9144000"/>
@@ -2972,1561 +2971,586 @@
       </p:grpSpPr>
       <p:grpSp>
         <p:nvGrpSpPr>
-          <p:cNvPr id="9" name="Group 8"/>
-          <p:cNvGrpSpPr/>
-          <p:nvPr/>
-        </p:nvGrpSpPr>
-        <p:grpSpPr>
-          <a:xfrm>
-            <a:off x="1568450" y="1092184"/>
-            <a:ext cx="2470149" cy="814820"/>
-            <a:chOff x="1568450" y="1079484"/>
-            <a:chExt cx="2470149" cy="814820"/>
-          </a:xfrm>
-        </p:grpSpPr>
-        <p:sp>
-          <p:nvSpPr>
-            <p:cNvPr id="2" name="Can 1"/>
-            <p:cNvSpPr/>
-            <p:nvPr/>
-          </p:nvSpPr>
-          <p:spPr>
-            <a:xfrm>
-              <a:off x="3447222" y="1079484"/>
-              <a:ext cx="506469" cy="501665"/>
-            </a:xfrm>
-            <a:prstGeom prst="can">
-              <a:avLst/>
-            </a:prstGeom>
-            <a:solidFill>
-              <a:schemeClr val="accent2">
-                <a:lumMod val="60000"/>
-                <a:lumOff val="40000"/>
-              </a:schemeClr>
-            </a:solidFill>
-          </p:spPr>
-          <p:style>
-            <a:lnRef idx="2">
-              <a:schemeClr val="accent1">
-                <a:shade val="50000"/>
-              </a:schemeClr>
-            </a:lnRef>
-            <a:fillRef idx="1">
-              <a:schemeClr val="accent1"/>
-            </a:fillRef>
-            <a:effectRef idx="0">
-              <a:schemeClr val="accent1"/>
-            </a:effectRef>
-            <a:fontRef idx="minor">
-              <a:schemeClr val="lt1"/>
-            </a:fontRef>
-          </p:style>
-          <p:txBody>
-            <a:bodyPr rtlCol="0" anchor="ctr"/>
-            <a:lstStyle/>
-            <a:p>
-              <a:pPr algn="ctr"/>
-              <a:r>
-                <a:rPr lang="en-US" dirty="0" smtClean="0">
-                  <a:latin typeface="Apple Chancery" charset="0"/>
-                </a:rPr>
-                <a:t>D</a:t>
-              </a:r>
-              <a:endParaRPr lang="en-US" dirty="0">
-                <a:latin typeface="Apple Chancery" charset="0"/>
-              </a:endParaRPr>
-            </a:p>
-          </p:txBody>
-        </p:sp>
-        <p:sp>
-          <p:nvSpPr>
-            <p:cNvPr id="3" name="Rounded Rectangle 2"/>
-            <p:cNvSpPr/>
-            <p:nvPr/>
-          </p:nvSpPr>
-          <p:spPr>
-            <a:xfrm>
-              <a:off x="1758950" y="1079500"/>
-              <a:ext cx="1219199" cy="501649"/>
-            </a:xfrm>
-            <a:prstGeom prst="roundRect">
-              <a:avLst/>
-            </a:prstGeom>
-            <a:solidFill>
-              <a:schemeClr val="accent1">
-                <a:lumMod val="75000"/>
-              </a:schemeClr>
-            </a:solidFill>
-          </p:spPr>
-          <p:style>
-            <a:lnRef idx="2">
-              <a:schemeClr val="accent1">
-                <a:shade val="50000"/>
-              </a:schemeClr>
-            </a:lnRef>
-            <a:fillRef idx="1">
-              <a:schemeClr val="accent1"/>
-            </a:fillRef>
-            <a:effectRef idx="0">
-              <a:schemeClr val="accent1"/>
-            </a:effectRef>
-            <a:fontRef idx="minor">
-              <a:schemeClr val="lt1"/>
-            </a:fontRef>
-          </p:style>
-          <p:txBody>
-            <a:bodyPr rtlCol="0" anchor="ctr"/>
-            <a:lstStyle/>
-            <a:p>
-              <a:pPr algn="ctr"/>
-              <a:r>
-                <a:rPr lang="en-US" i="1" dirty="0" smtClean="0">
-                  <a:latin typeface="Times New Roman" charset="0"/>
-                </a:rPr>
-                <a:t>p</a:t>
-              </a:r>
-              <a:r>
-                <a:rPr lang="en-US" dirty="0" smtClean="0">
-                  <a:latin typeface="Times New Roman" charset="0"/>
-                </a:rPr>
-                <a:t>(</a:t>
-              </a:r>
-              <a:r>
-                <a:rPr lang="en-US" b="1" dirty="0" smtClean="0">
-                  <a:latin typeface="Times New Roman" charset="0"/>
-                </a:rPr>
-                <a:t>x</a:t>
-              </a:r>
-              <a:r>
-                <a:rPr lang="en-US" dirty="0" smtClean="0">
-                  <a:latin typeface="Times New Roman" charset="0"/>
-                </a:rPr>
-                <a:t>, </a:t>
-              </a:r>
-              <a:r>
-                <a:rPr lang="en-US" i="1" dirty="0" smtClean="0">
-                  <a:latin typeface="Times New Roman" charset="0"/>
-                </a:rPr>
-                <a:t>s</a:t>
-              </a:r>
-              <a:r>
-                <a:rPr lang="en-US" dirty="0" smtClean="0">
-                  <a:latin typeface="Times New Roman" charset="0"/>
-                </a:rPr>
-                <a:t>)</a:t>
-              </a:r>
-              <a:endParaRPr lang="en-US" dirty="0">
-                <a:latin typeface="Times New Roman" charset="0"/>
-              </a:endParaRPr>
-            </a:p>
-          </p:txBody>
-        </p:sp>
-        <p:cxnSp>
-          <p:nvCxnSpPr>
-            <p:cNvPr id="16" name="Elbow Connector 15"/>
-            <p:cNvCxnSpPr>
-              <a:stCxn id="3" idx="3"/>
-              <a:endCxn id="2" idx="2"/>
-            </p:cNvCxnSpPr>
-            <p:nvPr/>
-          </p:nvCxnSpPr>
-          <p:spPr>
-            <a:xfrm flipV="1">
-              <a:off x="2978149" y="1330317"/>
-              <a:ext cx="469073" cy="8"/>
-            </a:xfrm>
-            <a:prstGeom prst="bentConnector3">
-              <a:avLst>
-                <a:gd name="adj1" fmla="val 50000"/>
-              </a:avLst>
-            </a:prstGeom>
-            <a:ln w="25400" cap="flat" cmpd="sng">
-              <a:prstDash val="solid"/>
-              <a:miter lim="800000"/>
-              <a:headEnd w="lg" len="lg"/>
-              <a:tailEnd type="triangle" w="lg" len="lg"/>
-            </a:ln>
-          </p:spPr>
-          <p:style>
-            <a:lnRef idx="1">
-              <a:schemeClr val="accent1"/>
-            </a:lnRef>
-            <a:fillRef idx="0">
-              <a:schemeClr val="accent1"/>
-            </a:fillRef>
-            <a:effectRef idx="0">
-              <a:schemeClr val="accent1"/>
-            </a:effectRef>
-            <a:fontRef idx="minor">
-              <a:schemeClr val="tx1"/>
-            </a:fontRef>
-          </p:style>
-        </p:cxnSp>
-        <p:sp>
-          <p:nvSpPr>
-            <p:cNvPr id="4" name="TextBox 3"/>
-            <p:cNvSpPr txBox="1"/>
-            <p:nvPr/>
-          </p:nvSpPr>
-          <p:spPr>
-            <a:xfrm>
-              <a:off x="1568450" y="1555750"/>
-              <a:ext cx="1822449" cy="338554"/>
-            </a:xfrm>
-            <a:prstGeom prst="rect">
-              <a:avLst/>
-            </a:prstGeom>
-            <a:noFill/>
-          </p:spPr>
-          <p:txBody>
-            <a:bodyPr wrap="square" rtlCol="0">
-              <a:spAutoFit/>
-            </a:bodyPr>
-            <a:lstStyle/>
-            <a:p>
-              <a:r>
-                <a:rPr lang="en-US" sz="1600" dirty="0"/>
-                <a:t>Unknown </a:t>
-              </a:r>
-              <a:r>
-                <a:rPr lang="en-US" sz="1600" dirty="0" smtClean="0"/>
-                <a:t>model</a:t>
-              </a:r>
-              <a:endParaRPr lang="en-US" sz="1600" dirty="0"/>
-            </a:p>
-          </p:txBody>
-        </p:sp>
-        <p:sp>
-          <p:nvSpPr>
-            <p:cNvPr id="7" name="TextBox 6"/>
-            <p:cNvSpPr txBox="1"/>
-            <p:nvPr/>
-          </p:nvSpPr>
-          <p:spPr>
-            <a:xfrm>
-              <a:off x="3365500" y="1549400"/>
-              <a:ext cx="673099" cy="338554"/>
-            </a:xfrm>
-            <a:prstGeom prst="rect">
-              <a:avLst/>
-            </a:prstGeom>
-            <a:noFill/>
-          </p:spPr>
-          <p:txBody>
-            <a:bodyPr wrap="square" rtlCol="0">
-              <a:spAutoFit/>
-            </a:bodyPr>
-            <a:lstStyle/>
-            <a:p>
-              <a:r>
-                <a:rPr lang="en-US" sz="1600" dirty="0" smtClean="0"/>
-                <a:t>Data</a:t>
-              </a:r>
-              <a:endParaRPr lang="en-US" sz="1600" dirty="0"/>
-            </a:p>
-          </p:txBody>
-        </p:sp>
-      </p:grpSp>
-    </p:spTree>
-    <p:extLst>
-      <p:ext uri="{BB962C8B-B14F-4D97-AF65-F5344CB8AC3E}">
-        <p14:creationId xmlns:p14="http://schemas.microsoft.com/office/powerpoint/2010/main" val="2036661148"/>
-      </p:ext>
-    </p:extLst>
-  </p:cSld>
-  <p:clrMapOvr>
-    <a:masterClrMapping/>
-  </p:clrMapOvr>
-  <p:timing>
-    <p:tnLst>
-      <p:par>
-        <p:cTn id="1" dur="indefinite" restart="never" nodeType="tmRoot"/>
-      </p:par>
-    </p:tnLst>
-  </p:timing>
-</p:sld>
-</file>
-
-<file path=ppt/slides/slide2.xml><?xml version="1.0" encoding="utf-8"?>
-<p:sld xmlns:a="http://schemas.openxmlformats.org/drawingml/2006/main" xmlns:r="http://schemas.openxmlformats.org/officeDocument/2006/relationships" xmlns:p="http://schemas.openxmlformats.org/presentationml/2006/main">
-  <p:cSld>
-    <p:spTree>
-      <p:nvGrpSpPr>
-        <p:cNvPr id="1" name=""/>
-        <p:cNvGrpSpPr/>
-        <p:nvPr/>
-      </p:nvGrpSpPr>
-      <p:grpSpPr>
-        <a:xfrm>
-          <a:off x="0" y="0"/>
-          <a:ext cx="0" cy="0"/>
-          <a:chOff x="0" y="0"/>
-          <a:chExt cx="0" cy="0"/>
-        </a:xfrm>
-      </p:grpSpPr>
-      <p:grpSp>
-        <p:nvGrpSpPr>
-          <p:cNvPr id="60" name="Group 59"/>
-          <p:cNvGrpSpPr/>
-          <p:nvPr/>
-        </p:nvGrpSpPr>
-        <p:grpSpPr>
-          <a:xfrm>
-            <a:off x="838964" y="964721"/>
-            <a:ext cx="3510785" cy="1645129"/>
-            <a:chOff x="858014" y="990121"/>
-            <a:chExt cx="3510785" cy="1645129"/>
-          </a:xfrm>
-        </p:grpSpPr>
-        <p:sp>
-          <p:nvSpPr>
-            <p:cNvPr id="29" name="Can 28"/>
-            <p:cNvSpPr/>
-            <p:nvPr/>
-          </p:nvSpPr>
-          <p:spPr>
-            <a:xfrm>
-              <a:off x="1252481" y="1047735"/>
-              <a:ext cx="506469" cy="501665"/>
-            </a:xfrm>
-            <a:prstGeom prst="can">
-              <a:avLst/>
-            </a:prstGeom>
-            <a:solidFill>
-              <a:schemeClr val="accent2">
-                <a:lumMod val="60000"/>
-                <a:lumOff val="40000"/>
-              </a:schemeClr>
-            </a:solidFill>
-          </p:spPr>
-          <p:style>
-            <a:lnRef idx="2">
-              <a:schemeClr val="accent1">
-                <a:shade val="50000"/>
-              </a:schemeClr>
-            </a:lnRef>
-            <a:fillRef idx="1">
-              <a:schemeClr val="accent1"/>
-            </a:fillRef>
-            <a:effectRef idx="0">
-              <a:schemeClr val="accent1"/>
-            </a:effectRef>
-            <a:fontRef idx="minor">
-              <a:schemeClr val="lt1"/>
-            </a:fontRef>
-          </p:style>
-          <p:txBody>
-            <a:bodyPr rtlCol="0" anchor="ctr"/>
-            <a:lstStyle/>
-            <a:p>
-              <a:pPr algn="ctr"/>
-              <a:r>
-                <a:rPr lang="en-US" dirty="0" smtClean="0">
-                  <a:latin typeface="Apple Chancery" charset="0"/>
-                </a:rPr>
-                <a:t>D</a:t>
-              </a:r>
-              <a:endParaRPr lang="en-US" dirty="0">
-                <a:latin typeface="Apple Chancery" charset="0"/>
-              </a:endParaRPr>
-            </a:p>
-          </p:txBody>
-        </p:sp>
-        <p:sp>
-          <p:nvSpPr>
-            <p:cNvPr id="30" name="Rounded Rectangle 29"/>
-            <p:cNvSpPr/>
-            <p:nvPr/>
-          </p:nvSpPr>
-          <p:spPr>
-            <a:xfrm>
-              <a:off x="2419351" y="990121"/>
-              <a:ext cx="1318387" cy="616429"/>
-            </a:xfrm>
-            <a:prstGeom prst="roundRect">
-              <a:avLst/>
-            </a:prstGeom>
-            <a:solidFill>
-              <a:schemeClr val="accent1">
-                <a:lumMod val="75000"/>
-              </a:schemeClr>
-            </a:solidFill>
-          </p:spPr>
-          <p:style>
-            <a:lnRef idx="2">
-              <a:schemeClr val="accent1">
-                <a:shade val="50000"/>
-              </a:schemeClr>
-            </a:lnRef>
-            <a:fillRef idx="1">
-              <a:schemeClr val="accent1"/>
-            </a:fillRef>
-            <a:effectRef idx="0">
-              <a:schemeClr val="accent1"/>
-            </a:effectRef>
-            <a:fontRef idx="minor">
-              <a:schemeClr val="lt1"/>
-            </a:fontRef>
-          </p:style>
-          <p:txBody>
-            <a:bodyPr rtlCol="0" anchor="ctr"/>
-            <a:lstStyle/>
-            <a:p>
-              <a:pPr algn="ctr"/>
-              <a:r>
-                <a:rPr lang="en-US" dirty="0" smtClean="0"/>
-                <a:t>Model estimation</a:t>
-              </a:r>
-              <a:endParaRPr lang="en-US" dirty="0"/>
-            </a:p>
-          </p:txBody>
-        </p:sp>
-        <p:cxnSp>
-          <p:nvCxnSpPr>
-            <p:cNvPr id="31" name="Elbow Connector 30"/>
-            <p:cNvCxnSpPr>
-              <a:stCxn id="29" idx="4"/>
-              <a:endCxn id="30" idx="1"/>
-            </p:cNvCxnSpPr>
-            <p:nvPr/>
-          </p:nvCxnSpPr>
-          <p:spPr>
-            <a:xfrm flipV="1">
-              <a:off x="1758950" y="1298336"/>
-              <a:ext cx="660401" cy="232"/>
-            </a:xfrm>
-            <a:prstGeom prst="bentConnector3">
-              <a:avLst>
-                <a:gd name="adj1" fmla="val 50000"/>
-              </a:avLst>
-            </a:prstGeom>
-            <a:ln w="25400" cap="flat" cmpd="sng">
-              <a:prstDash val="solid"/>
-              <a:miter lim="800000"/>
-              <a:headEnd w="lg" len="lg"/>
-              <a:tailEnd type="triangle" w="lg" len="lg"/>
-            </a:ln>
-          </p:spPr>
-          <p:style>
-            <a:lnRef idx="1">
-              <a:schemeClr val="accent1"/>
-            </a:lnRef>
-            <a:fillRef idx="0">
-              <a:schemeClr val="accent1"/>
-            </a:fillRef>
-            <a:effectRef idx="0">
-              <a:schemeClr val="accent1"/>
-            </a:effectRef>
-            <a:fontRef idx="minor">
-              <a:schemeClr val="tx1"/>
-            </a:fontRef>
-          </p:style>
-        </p:cxnSp>
-        <p:sp>
-          <p:nvSpPr>
-            <p:cNvPr id="33" name="TextBox 32"/>
-            <p:cNvSpPr txBox="1"/>
-            <p:nvPr/>
-          </p:nvSpPr>
-          <p:spPr>
-            <a:xfrm>
-              <a:off x="858014" y="1544422"/>
-              <a:ext cx="1434336" cy="369332"/>
-            </a:xfrm>
-            <a:prstGeom prst="rect">
-              <a:avLst/>
-            </a:prstGeom>
-            <a:noFill/>
-          </p:spPr>
-          <p:txBody>
-            <a:bodyPr wrap="square" rtlCol="0">
-              <a:spAutoFit/>
-            </a:bodyPr>
-            <a:lstStyle/>
-            <a:p>
-              <a:r>
-                <a:rPr lang="en-US" smtClean="0"/>
-                <a:t>Training Data</a:t>
-              </a:r>
-              <a:endParaRPr lang="en-US" dirty="0"/>
-            </a:p>
-          </p:txBody>
-        </p:sp>
-        <p:sp>
-          <p:nvSpPr>
-            <p:cNvPr id="35" name="Rounded Rectangle 34"/>
-            <p:cNvSpPr/>
-            <p:nvPr/>
-          </p:nvSpPr>
-          <p:spPr>
-            <a:xfrm>
-              <a:off x="2470149" y="2133601"/>
-              <a:ext cx="1219199" cy="501649"/>
-            </a:xfrm>
-            <a:prstGeom prst="roundRect">
-              <a:avLst/>
-            </a:prstGeom>
-            <a:solidFill>
-              <a:schemeClr val="accent1">
-                <a:lumMod val="75000"/>
-              </a:schemeClr>
-            </a:solidFill>
-          </p:spPr>
-          <p:style>
-            <a:lnRef idx="2">
-              <a:schemeClr val="accent1">
-                <a:shade val="50000"/>
-              </a:schemeClr>
-            </a:lnRef>
-            <a:fillRef idx="1">
-              <a:schemeClr val="accent1"/>
-            </a:fillRef>
-            <a:effectRef idx="0">
-              <a:schemeClr val="accent1"/>
-            </a:effectRef>
-            <a:fontRef idx="minor">
-              <a:schemeClr val="lt1"/>
-            </a:fontRef>
-          </p:style>
-          <p:txBody>
-            <a:bodyPr rtlCol="0" anchor="ctr"/>
-            <a:lstStyle/>
-            <a:p>
-              <a:pPr algn="ctr"/>
-              <a:r>
-                <a:rPr lang="en-US" smtClean="0"/>
-                <a:t>Predictor</a:t>
-              </a:r>
-              <a:endParaRPr lang="en-US" dirty="0"/>
-            </a:p>
-          </p:txBody>
-        </p:sp>
-        <mc:AlternateContent xmlns:mc="http://schemas.openxmlformats.org/markup-compatibility/2006" xmlns:a14="http://schemas.microsoft.com/office/drawing/2010/main">
-          <mc:Choice Requires="a14">
-            <p:sp>
-              <p:nvSpPr>
-                <p:cNvPr id="36" name="TextBox 35"/>
-                <p:cNvSpPr txBox="1"/>
-                <p:nvPr/>
-              </p:nvSpPr>
-              <p:spPr>
-                <a:xfrm>
-                  <a:off x="1806957" y="2203451"/>
-                  <a:ext cx="373886" cy="369333"/>
-                </a:xfrm>
-                <a:prstGeom prst="rect">
-                  <a:avLst/>
-                </a:prstGeom>
-                <a:noFill/>
-              </p:spPr>
-              <p:txBody>
-                <a:bodyPr wrap="square" rtlCol="0">
-                  <a:spAutoFit/>
-                </a:bodyPr>
-                <a:lstStyle/>
-                <a:p>
-                  <a:pPr/>
-                  <a14:m>
-                    <m:oMathPara xmlns:m="http://schemas.openxmlformats.org/officeDocument/2006/math">
-                      <m:oMathParaPr>
-                        <m:jc m:val="centerGroup"/>
-                      </m:oMathParaPr>
-                      <m:oMath xmlns:m="http://schemas.openxmlformats.org/officeDocument/2006/math">
-                        <m:r>
-                          <a:rPr lang="es-ES" b="1" i="0" smtClean="0">
-                            <a:latin typeface="Cambria Math" charset="0"/>
-                            <a:ea typeface="Times New Roman" charset="0"/>
-                            <a:cs typeface="Times New Roman" charset="0"/>
-                          </a:rPr>
-                          <m:t>𝐱</m:t>
-                        </m:r>
-                      </m:oMath>
-                    </m:oMathPara>
-                  </a14:m>
-                  <a:endParaRPr lang="en-US" b="1" dirty="0">
-                    <a:latin typeface="Times New Roman" charset="0"/>
-                    <a:ea typeface="Times New Roman" charset="0"/>
-                    <a:cs typeface="Times New Roman" charset="0"/>
-                  </a:endParaRPr>
-                </a:p>
-              </p:txBody>
-            </p:sp>
-          </mc:Choice>
-          <mc:Fallback xmlns="">
-            <p:sp>
-              <p:nvSpPr>
-                <p:cNvPr id="36" name="TextBox 35"/>
-                <p:cNvSpPr txBox="1">
-                  <a:spLocks noRot="1" noChangeAspect="1" noMove="1" noResize="1" noEditPoints="1" noAdjustHandles="1" noChangeArrowheads="1" noChangeShapeType="1" noTextEdit="1"/>
-                </p:cNvSpPr>
-                <p:nvPr/>
-              </p:nvSpPr>
-              <p:spPr>
-                <a:xfrm>
-                  <a:off x="1806957" y="2203451"/>
-                  <a:ext cx="373886" cy="369333"/>
-                </a:xfrm>
-                <a:prstGeom prst="rect">
-                  <a:avLst/>
-                </a:prstGeom>
-                <a:blipFill rotWithShape="0">
-                  <a:blip r:embed="rId2"/>
-                  <a:stretch>
-                    <a:fillRect/>
-                  </a:stretch>
-                </a:blipFill>
-              </p:spPr>
-              <p:txBody>
-                <a:bodyPr/>
-                <a:lstStyle/>
-                <a:p>
-                  <a:r>
-                    <a:rPr lang="en-US">
-                      <a:noFill/>
-                    </a:rPr>
-                    <a:t> </a:t>
-                  </a:r>
-                </a:p>
-              </p:txBody>
-            </p:sp>
-          </mc:Fallback>
-        </mc:AlternateContent>
-        <p:cxnSp>
-          <p:nvCxnSpPr>
-            <p:cNvPr id="37" name="Elbow Connector 36"/>
-            <p:cNvCxnSpPr>
-              <a:stCxn id="36" idx="3"/>
-              <a:endCxn id="35" idx="1"/>
-            </p:cNvCxnSpPr>
-            <p:nvPr/>
-          </p:nvCxnSpPr>
-          <p:spPr>
-            <a:xfrm flipV="1">
-              <a:off x="2180843" y="2384426"/>
-              <a:ext cx="289306" cy="3692"/>
-            </a:xfrm>
-            <a:prstGeom prst="bentConnector3">
-              <a:avLst>
-                <a:gd name="adj1" fmla="val 50000"/>
-              </a:avLst>
-            </a:prstGeom>
-            <a:ln w="25400" cap="flat" cmpd="sng">
-              <a:prstDash val="solid"/>
-              <a:miter lim="800000"/>
-              <a:headEnd w="lg" len="lg"/>
-              <a:tailEnd type="triangle" w="lg" len="lg"/>
-            </a:ln>
-          </p:spPr>
-          <p:style>
-            <a:lnRef idx="1">
-              <a:schemeClr val="accent1"/>
-            </a:lnRef>
-            <a:fillRef idx="0">
-              <a:schemeClr val="accent1"/>
-            </a:fillRef>
-            <a:effectRef idx="0">
-              <a:schemeClr val="accent1"/>
-            </a:effectRef>
-            <a:fontRef idx="minor">
-              <a:schemeClr val="tx1"/>
-            </a:fontRef>
-          </p:style>
-        </p:cxnSp>
-        <mc:AlternateContent xmlns:mc="http://schemas.openxmlformats.org/markup-compatibility/2006" xmlns:a14="http://schemas.microsoft.com/office/drawing/2010/main">
-          <mc:Choice Requires="a14">
-            <p:sp>
-              <p:nvSpPr>
-                <p:cNvPr id="40" name="TextBox 39"/>
-                <p:cNvSpPr txBox="1"/>
-                <p:nvPr/>
-              </p:nvSpPr>
-              <p:spPr>
-                <a:xfrm>
-                  <a:off x="4042154" y="2197101"/>
-                  <a:ext cx="326645" cy="369332"/>
-                </a:xfrm>
-                <a:prstGeom prst="rect">
-                  <a:avLst/>
-                </a:prstGeom>
-                <a:noFill/>
-              </p:spPr>
-              <p:txBody>
-                <a:bodyPr wrap="square" rtlCol="0">
-                  <a:spAutoFit/>
-                </a:bodyPr>
-                <a:lstStyle/>
-                <a:p>
-                  <a:pPr/>
-                  <a14:m>
-                    <m:oMathPara xmlns:m="http://schemas.openxmlformats.org/officeDocument/2006/math">
-                      <m:oMathParaPr>
-                        <m:jc m:val="centerGroup"/>
-                      </m:oMathParaPr>
-                      <m:oMath xmlns:m="http://schemas.openxmlformats.org/officeDocument/2006/math">
-                        <m:acc>
-                          <m:accPr>
-                            <m:chr m:val="̂"/>
-                            <m:ctrlPr>
-                              <a:rPr lang="es-ES" b="0" i="1" smtClean="0">
-                                <a:latin typeface="Cambria Math" charset="0"/>
-                                <a:ea typeface="Times New Roman" charset="0"/>
-                                <a:cs typeface="Times New Roman" charset="0"/>
-                              </a:rPr>
-                            </m:ctrlPr>
-                          </m:accPr>
-                          <m:e>
-                            <m:r>
-                              <a:rPr lang="es-ES" b="0" i="1" smtClean="0">
-                                <a:latin typeface="Cambria Math" charset="0"/>
-                                <a:ea typeface="Times New Roman" charset="0"/>
-                                <a:cs typeface="Times New Roman" charset="0"/>
-                              </a:rPr>
-                              <m:t>𝑠</m:t>
-                            </m:r>
-                          </m:e>
-                        </m:acc>
-                      </m:oMath>
-                    </m:oMathPara>
-                  </a14:m>
-                  <a:endParaRPr lang="en-US" i="1" dirty="0">
-                    <a:latin typeface="Times New Roman" charset="0"/>
-                    <a:ea typeface="Times New Roman" charset="0"/>
-                    <a:cs typeface="Times New Roman" charset="0"/>
-                  </a:endParaRPr>
-                </a:p>
-              </p:txBody>
-            </p:sp>
-          </mc:Choice>
-          <mc:Fallback xmlns="">
-            <p:sp>
-              <p:nvSpPr>
-                <p:cNvPr id="40" name="TextBox 39"/>
-                <p:cNvSpPr txBox="1">
-                  <a:spLocks noRot="1" noChangeAspect="1" noMove="1" noResize="1" noEditPoints="1" noAdjustHandles="1" noChangeArrowheads="1" noChangeShapeType="1" noTextEdit="1"/>
-                </p:cNvSpPr>
-                <p:nvPr/>
-              </p:nvSpPr>
-              <p:spPr>
-                <a:xfrm>
-                  <a:off x="4042154" y="2197101"/>
-                  <a:ext cx="326645" cy="369332"/>
-                </a:xfrm>
-                <a:prstGeom prst="rect">
-                  <a:avLst/>
-                </a:prstGeom>
-                <a:blipFill rotWithShape="0">
-                  <a:blip r:embed="rId3"/>
-                  <a:stretch>
-                    <a:fillRect t="-1639" r="-31481"/>
-                  </a:stretch>
-                </a:blipFill>
-              </p:spPr>
-              <p:txBody>
-                <a:bodyPr/>
-                <a:lstStyle/>
-                <a:p>
-                  <a:r>
-                    <a:rPr lang="en-US">
-                      <a:noFill/>
-                    </a:rPr>
-                    <a:t> </a:t>
-                  </a:r>
-                </a:p>
-              </p:txBody>
-            </p:sp>
-          </mc:Fallback>
-        </mc:AlternateContent>
-        <p:cxnSp>
-          <p:nvCxnSpPr>
-            <p:cNvPr id="41" name="Elbow Connector 40"/>
-            <p:cNvCxnSpPr>
-              <a:stCxn id="35" idx="3"/>
-              <a:endCxn id="40" idx="1"/>
-            </p:cNvCxnSpPr>
-            <p:nvPr/>
-          </p:nvCxnSpPr>
-          <p:spPr>
-            <a:xfrm flipV="1">
-              <a:off x="3689348" y="2381767"/>
-              <a:ext cx="352806" cy="2659"/>
-            </a:xfrm>
-            <a:prstGeom prst="bentConnector3">
-              <a:avLst>
-                <a:gd name="adj1" fmla="val 50000"/>
-              </a:avLst>
-            </a:prstGeom>
-            <a:ln w="25400" cap="flat" cmpd="sng">
-              <a:prstDash val="solid"/>
-              <a:miter lim="800000"/>
-              <a:headEnd w="lg" len="lg"/>
-              <a:tailEnd type="triangle" w="lg" len="lg"/>
-            </a:ln>
-          </p:spPr>
-          <p:style>
-            <a:lnRef idx="1">
-              <a:schemeClr val="accent1"/>
-            </a:lnRef>
-            <a:fillRef idx="0">
-              <a:schemeClr val="accent1"/>
-            </a:fillRef>
-            <a:effectRef idx="0">
-              <a:schemeClr val="accent1"/>
-            </a:effectRef>
-            <a:fontRef idx="minor">
-              <a:schemeClr val="tx1"/>
-            </a:fontRef>
-          </p:style>
-        </p:cxnSp>
-        <p:cxnSp>
-          <p:nvCxnSpPr>
-            <p:cNvPr id="47" name="Elbow Connector 46"/>
-            <p:cNvCxnSpPr>
-              <a:stCxn id="30" idx="2"/>
-              <a:endCxn id="35" idx="0"/>
-            </p:cNvCxnSpPr>
-            <p:nvPr/>
-          </p:nvCxnSpPr>
-          <p:spPr>
-            <a:xfrm rot="16200000" flipH="1">
-              <a:off x="2815622" y="1869473"/>
-              <a:ext cx="527051" cy="1204"/>
-            </a:xfrm>
-            <a:prstGeom prst="bentConnector3">
-              <a:avLst>
-                <a:gd name="adj1" fmla="val 50000"/>
-              </a:avLst>
-            </a:prstGeom>
-            <a:ln w="25400" cap="flat" cmpd="sng">
-              <a:prstDash val="solid"/>
-              <a:miter lim="800000"/>
-              <a:headEnd w="lg" len="lg"/>
-              <a:tailEnd type="triangle" w="lg" len="lg"/>
-            </a:ln>
-          </p:spPr>
-          <p:style>
-            <a:lnRef idx="1">
-              <a:schemeClr val="accent1"/>
-            </a:lnRef>
-            <a:fillRef idx="0">
-              <a:schemeClr val="accent1"/>
-            </a:fillRef>
-            <a:effectRef idx="0">
-              <a:schemeClr val="accent1"/>
-            </a:effectRef>
-            <a:fontRef idx="minor">
-              <a:schemeClr val="tx1"/>
-            </a:fontRef>
-          </p:style>
-        </p:cxnSp>
-        <mc:AlternateContent xmlns:mc="http://schemas.openxmlformats.org/markup-compatibility/2006" xmlns:a14="http://schemas.microsoft.com/office/drawing/2010/main">
-          <mc:Choice Requires="a14">
-            <p:sp>
-              <p:nvSpPr>
-                <p:cNvPr id="56" name="TextBox 55"/>
-                <p:cNvSpPr txBox="1"/>
-                <p:nvPr/>
-              </p:nvSpPr>
-              <p:spPr>
-                <a:xfrm>
-                  <a:off x="3087627" y="1612126"/>
-                  <a:ext cx="777111" cy="369332"/>
-                </a:xfrm>
-                <a:prstGeom prst="rect">
-                  <a:avLst/>
-                </a:prstGeom>
-                <a:noFill/>
-              </p:spPr>
-              <p:txBody>
-                <a:bodyPr wrap="square" rtlCol="0">
-                  <a:spAutoFit/>
-                </a:bodyPr>
-                <a:lstStyle/>
-                <a:p>
-                  <a:pPr/>
-                  <a14:m>
-                    <m:oMathPara xmlns:m="http://schemas.openxmlformats.org/officeDocument/2006/math">
-                      <m:oMathParaPr>
-                        <m:jc m:val="centerGroup"/>
-                      </m:oMathParaPr>
-                      <m:oMath xmlns:m="http://schemas.openxmlformats.org/officeDocument/2006/math">
-                        <m:acc>
-                          <m:accPr>
-                            <m:chr m:val="̂"/>
-                            <m:ctrlPr>
-                              <a:rPr lang="es-ES" b="0" i="1" smtClean="0">
-                                <a:latin typeface="Cambria Math" charset="0"/>
-                                <a:ea typeface="Times New Roman" charset="0"/>
-                                <a:cs typeface="Times New Roman" charset="0"/>
-                              </a:rPr>
-                            </m:ctrlPr>
-                          </m:accPr>
-                          <m:e>
-                            <m:r>
-                              <a:rPr lang="es-ES" b="0" i="1" smtClean="0">
-                                <a:latin typeface="Cambria Math" charset="0"/>
-                                <a:ea typeface="Times New Roman" charset="0"/>
-                                <a:cs typeface="Times New Roman" charset="0"/>
-                              </a:rPr>
-                              <m:t>𝑝</m:t>
-                            </m:r>
-                          </m:e>
-                        </m:acc>
-                        <m:d>
-                          <m:dPr>
-                            <m:ctrlPr>
-                              <a:rPr lang="is-IS" b="0" i="1" smtClean="0">
-                                <a:latin typeface="Cambria Math" charset="0"/>
-                                <a:ea typeface="Times New Roman" charset="0"/>
-                                <a:cs typeface="Times New Roman" charset="0"/>
-                              </a:rPr>
-                            </m:ctrlPr>
-                          </m:dPr>
-                          <m:e>
-                            <m:r>
-                              <a:rPr lang="es-ES" b="0" i="1" smtClean="0">
-                                <a:latin typeface="Cambria Math" charset="0"/>
-                                <a:ea typeface="Times New Roman" charset="0"/>
-                                <a:cs typeface="Times New Roman" charset="0"/>
-                              </a:rPr>
-                              <m:t>𝑠</m:t>
-                            </m:r>
-                            <m:r>
-                              <a:rPr lang="es-ES" b="0" i="1" smtClean="0">
-                                <a:latin typeface="Cambria Math" charset="0"/>
-                                <a:ea typeface="Times New Roman" charset="0"/>
-                                <a:cs typeface="Times New Roman" charset="0"/>
-                              </a:rPr>
-                              <m:t>|</m:t>
-                            </m:r>
-                            <m:r>
-                              <a:rPr lang="es-ES" b="1">
-                                <a:latin typeface="Cambria Math" charset="0"/>
-                                <a:ea typeface="Times New Roman" charset="0"/>
-                                <a:cs typeface="Times New Roman" charset="0"/>
-                              </a:rPr>
-                              <m:t>𝐱</m:t>
-                            </m:r>
-                          </m:e>
-                        </m:d>
-                      </m:oMath>
-                    </m:oMathPara>
-                  </a14:m>
-                  <a:endParaRPr lang="en-US" i="1" dirty="0">
-                    <a:latin typeface="Times New Roman" charset="0"/>
-                    <a:ea typeface="Times New Roman" charset="0"/>
-                    <a:cs typeface="Times New Roman" charset="0"/>
-                  </a:endParaRPr>
-                </a:p>
-              </p:txBody>
-            </p:sp>
-          </mc:Choice>
-          <mc:Fallback xmlns="">
-            <p:sp>
-              <p:nvSpPr>
-                <p:cNvPr id="56" name="TextBox 55"/>
-                <p:cNvSpPr txBox="1">
-                  <a:spLocks noRot="1" noChangeAspect="1" noMove="1" noResize="1" noEditPoints="1" noAdjustHandles="1" noChangeArrowheads="1" noChangeShapeType="1" noTextEdit="1"/>
-                </p:cNvSpPr>
-                <p:nvPr/>
-              </p:nvSpPr>
-              <p:spPr>
-                <a:xfrm>
-                  <a:off x="3087627" y="1612126"/>
-                  <a:ext cx="777111" cy="369332"/>
-                </a:xfrm>
-                <a:prstGeom prst="rect">
-                  <a:avLst/>
-                </a:prstGeom>
-                <a:blipFill rotWithShape="0">
-                  <a:blip r:embed="rId4"/>
-                  <a:stretch>
-                    <a:fillRect t="-1639" b="-14754"/>
-                  </a:stretch>
-                </a:blipFill>
-              </p:spPr>
-              <p:txBody>
-                <a:bodyPr/>
-                <a:lstStyle/>
-                <a:p>
-                  <a:r>
-                    <a:rPr lang="en-US">
-                      <a:noFill/>
-                    </a:rPr>
-                    <a:t> </a:t>
-                  </a:r>
-                </a:p>
-              </p:txBody>
-            </p:sp>
-          </mc:Fallback>
-        </mc:AlternateContent>
-      </p:grpSp>
-      <p:grpSp>
-        <p:nvGrpSpPr>
-          <p:cNvPr id="87" name="Group 86"/>
+          <p:cNvPr id="3" name="Group 2"/>
           <p:cNvGrpSpPr/>
           <p:nvPr/>
         </p:nvGrpSpPr>
         <p:grpSpPr>
           <a:xfrm>
             <a:off x="838964" y="3011706"/>
-            <a:ext cx="3453636" cy="1645129"/>
-            <a:chOff x="858014" y="990121"/>
-            <a:chExt cx="3453636" cy="1645129"/>
+            <a:ext cx="4906006" cy="1728922"/>
+            <a:chOff x="838964" y="3011706"/>
+            <a:chExt cx="4906006" cy="1728922"/>
           </a:xfrm>
         </p:grpSpPr>
-        <p:sp>
-          <p:nvSpPr>
-            <p:cNvPr id="88" name="Can 87"/>
-            <p:cNvSpPr/>
+        <p:grpSp>
+          <p:nvGrpSpPr>
+            <p:cNvPr id="87" name="Group 86"/>
+            <p:cNvGrpSpPr/>
             <p:nvPr/>
-          </p:nvSpPr>
+          </p:nvGrpSpPr>
+          <p:grpSpPr>
+            <a:xfrm>
+              <a:off x="838964" y="3011706"/>
+              <a:ext cx="3453636" cy="1645129"/>
+              <a:chOff x="858014" y="990121"/>
+              <a:chExt cx="3453636" cy="1645129"/>
+            </a:xfrm>
+          </p:grpSpPr>
+          <p:sp>
+            <p:nvSpPr>
+              <p:cNvPr id="88" name="Can 87"/>
+              <p:cNvSpPr/>
+              <p:nvPr/>
+            </p:nvSpPr>
+            <p:spPr>
+              <a:xfrm>
+                <a:off x="1252481" y="1047735"/>
+                <a:ext cx="506469" cy="501665"/>
+              </a:xfrm>
+              <a:prstGeom prst="can">
+                <a:avLst/>
+              </a:prstGeom>
+              <a:solidFill>
+                <a:schemeClr val="accent2">
+                  <a:lumMod val="60000"/>
+                  <a:lumOff val="40000"/>
+                </a:schemeClr>
+              </a:solidFill>
+            </p:spPr>
+            <p:style>
+              <a:lnRef idx="2">
+                <a:schemeClr val="accent1">
+                  <a:shade val="50000"/>
+                </a:schemeClr>
+              </a:lnRef>
+              <a:fillRef idx="1">
+                <a:schemeClr val="accent1"/>
+              </a:fillRef>
+              <a:effectRef idx="0">
+                <a:schemeClr val="accent1"/>
+              </a:effectRef>
+              <a:fontRef idx="minor">
+                <a:schemeClr val="lt1"/>
+              </a:fontRef>
+            </p:style>
+            <p:txBody>
+              <a:bodyPr rtlCol="0" anchor="ctr"/>
+              <a:lstStyle/>
+              <a:p>
+                <a:pPr algn="ctr"/>
+                <a:r>
+                  <a:rPr lang="en-US" dirty="0" smtClean="0">
+                    <a:latin typeface="Apple Chancery" charset="0"/>
+                  </a:rPr>
+                  <a:t>D</a:t>
+                </a:r>
+                <a:endParaRPr lang="en-US" dirty="0">
+                  <a:latin typeface="Apple Chancery" charset="0"/>
+                </a:endParaRPr>
+              </a:p>
+            </p:txBody>
+          </p:sp>
+          <p:sp>
+            <p:nvSpPr>
+              <p:cNvPr id="89" name="Rounded Rectangle 88"/>
+              <p:cNvSpPr/>
+              <p:nvPr/>
+            </p:nvSpPr>
+            <p:spPr>
+              <a:xfrm>
+                <a:off x="2419351" y="990121"/>
+                <a:ext cx="1892299" cy="616429"/>
+              </a:xfrm>
+              <a:prstGeom prst="roundRect">
+                <a:avLst/>
+              </a:prstGeom>
+              <a:solidFill>
+                <a:schemeClr val="accent1">
+                  <a:lumMod val="75000"/>
+                </a:schemeClr>
+              </a:solidFill>
+            </p:spPr>
+            <p:style>
+              <a:lnRef idx="2">
+                <a:schemeClr val="accent1">
+                  <a:shade val="50000"/>
+                </a:schemeClr>
+              </a:lnRef>
+              <a:fillRef idx="1">
+                <a:schemeClr val="accent1"/>
+              </a:fillRef>
+              <a:effectRef idx="0">
+                <a:schemeClr val="accent1"/>
+              </a:effectRef>
+              <a:fontRef idx="minor">
+                <a:schemeClr val="lt1"/>
+              </a:fontRef>
+            </p:style>
+            <p:txBody>
+              <a:bodyPr rtlCol="0" anchor="ctr"/>
+              <a:lstStyle/>
+              <a:p>
+                <a:pPr algn="ctr"/>
+                <a:r>
+                  <a:rPr lang="en-US" dirty="0" smtClean="0"/>
+                  <a:t>Parametric model estimation</a:t>
+                </a:r>
+                <a:endParaRPr lang="en-US" dirty="0"/>
+              </a:p>
+            </p:txBody>
+          </p:sp>
+          <p:cxnSp>
+            <p:nvCxnSpPr>
+              <p:cNvPr id="90" name="Elbow Connector 89"/>
+              <p:cNvCxnSpPr/>
+              <p:nvPr/>
+            </p:nvCxnSpPr>
+            <p:spPr>
+              <a:xfrm flipV="1">
+                <a:off x="1758950" y="1298336"/>
+                <a:ext cx="660401" cy="232"/>
+              </a:xfrm>
+              <a:prstGeom prst="bentConnector3">
+                <a:avLst>
+                  <a:gd name="adj1" fmla="val 50000"/>
+                </a:avLst>
+              </a:prstGeom>
+              <a:ln w="25400" cap="flat" cmpd="sng">
+                <a:prstDash val="solid"/>
+                <a:miter lim="800000"/>
+                <a:headEnd w="lg" len="lg"/>
+                <a:tailEnd type="triangle" w="lg" len="lg"/>
+              </a:ln>
+            </p:spPr>
+            <p:style>
+              <a:lnRef idx="1">
+                <a:schemeClr val="accent1"/>
+              </a:lnRef>
+              <a:fillRef idx="0">
+                <a:schemeClr val="accent1"/>
+              </a:fillRef>
+              <a:effectRef idx="0">
+                <a:schemeClr val="accent1"/>
+              </a:effectRef>
+              <a:fontRef idx="minor">
+                <a:schemeClr val="tx1"/>
+              </a:fontRef>
+            </p:style>
+          </p:cxnSp>
+          <p:sp>
+            <p:nvSpPr>
+              <p:cNvPr id="91" name="TextBox 90"/>
+              <p:cNvSpPr txBox="1"/>
+              <p:nvPr/>
+            </p:nvSpPr>
+            <p:spPr>
+              <a:xfrm>
+                <a:off x="858014" y="1544422"/>
+                <a:ext cx="1434336" cy="369332"/>
+              </a:xfrm>
+              <a:prstGeom prst="rect">
+                <a:avLst/>
+              </a:prstGeom>
+              <a:noFill/>
+            </p:spPr>
+            <p:txBody>
+              <a:bodyPr wrap="square" rtlCol="0">
+                <a:spAutoFit/>
+              </a:bodyPr>
+              <a:lstStyle/>
+              <a:p>
+                <a:r>
+                  <a:rPr lang="en-US" smtClean="0"/>
+                  <a:t>Training Data</a:t>
+                </a:r>
+                <a:endParaRPr lang="en-US" dirty="0"/>
+              </a:p>
+            </p:txBody>
+          </p:sp>
+          <p:sp>
+            <p:nvSpPr>
+              <p:cNvPr id="92" name="Rounded Rectangle 91"/>
+              <p:cNvSpPr/>
+              <p:nvPr/>
+            </p:nvSpPr>
+            <p:spPr>
+              <a:xfrm>
+                <a:off x="2470149" y="2133601"/>
+                <a:ext cx="1219199" cy="501649"/>
+              </a:xfrm>
+              <a:prstGeom prst="roundRect">
+                <a:avLst/>
+              </a:prstGeom>
+              <a:solidFill>
+                <a:schemeClr val="accent1">
+                  <a:lumMod val="75000"/>
+                </a:schemeClr>
+              </a:solidFill>
+            </p:spPr>
+            <p:style>
+              <a:lnRef idx="2">
+                <a:schemeClr val="accent1">
+                  <a:shade val="50000"/>
+                </a:schemeClr>
+              </a:lnRef>
+              <a:fillRef idx="1">
+                <a:schemeClr val="accent1"/>
+              </a:fillRef>
+              <a:effectRef idx="0">
+                <a:schemeClr val="accent1"/>
+              </a:effectRef>
+              <a:fontRef idx="minor">
+                <a:schemeClr val="lt1"/>
+              </a:fontRef>
+            </p:style>
+            <p:txBody>
+              <a:bodyPr rtlCol="0" anchor="ctr"/>
+              <a:lstStyle/>
+              <a:p>
+                <a:pPr algn="ctr"/>
+                <a:r>
+                  <a:rPr lang="en-US" dirty="0" smtClean="0"/>
+                  <a:t>Decider</a:t>
+                </a:r>
+                <a:endParaRPr lang="en-US" dirty="0"/>
+              </a:p>
+            </p:txBody>
+          </p:sp>
+          <mc:AlternateContent xmlns:mc="http://schemas.openxmlformats.org/markup-compatibility/2006" xmlns:a14="http://schemas.microsoft.com/office/drawing/2010/main">
+            <mc:Choice Requires="a14">
+              <p:sp>
+                <p:nvSpPr>
+                  <p:cNvPr id="93" name="TextBox 92"/>
+                  <p:cNvSpPr txBox="1"/>
+                  <p:nvPr/>
+                </p:nvSpPr>
+                <p:spPr>
+                  <a:xfrm>
+                    <a:off x="1806957" y="2203451"/>
+                    <a:ext cx="373886" cy="369333"/>
+                  </a:xfrm>
+                  <a:prstGeom prst="rect">
+                    <a:avLst/>
+                  </a:prstGeom>
+                  <a:noFill/>
+                </p:spPr>
+                <p:txBody>
+                  <a:bodyPr wrap="square" rtlCol="0">
+                    <a:spAutoFit/>
+                  </a:bodyPr>
+                  <a:lstStyle/>
+                  <a:p>
+                    <a:pPr/>
+                    <a14:m>
+                      <m:oMathPara xmlns:m="http://schemas.openxmlformats.org/officeDocument/2006/math">
+                        <m:oMathParaPr>
+                          <m:jc m:val="centerGroup"/>
+                        </m:oMathParaPr>
+                        <m:oMath xmlns:m="http://schemas.openxmlformats.org/officeDocument/2006/math">
+                          <m:r>
+                            <a:rPr lang="es-ES" b="1" i="0" smtClean="0">
+                              <a:latin typeface="Cambria Math" charset="0"/>
+                              <a:ea typeface="Times New Roman" charset="0"/>
+                              <a:cs typeface="Times New Roman" charset="0"/>
+                            </a:rPr>
+                            <m:t>𝐱</m:t>
+                          </m:r>
+                        </m:oMath>
+                      </m:oMathPara>
+                    </a14:m>
+                    <a:endParaRPr lang="en-US" b="1" dirty="0">
+                      <a:latin typeface="Times New Roman" charset="0"/>
+                      <a:ea typeface="Times New Roman" charset="0"/>
+                      <a:cs typeface="Times New Roman" charset="0"/>
+                    </a:endParaRPr>
+                  </a:p>
+                </p:txBody>
+              </p:sp>
+            </mc:Choice>
+            <mc:Fallback xmlns="">
+              <p:sp>
+                <p:nvSpPr>
+                  <p:cNvPr id="93" name="TextBox 92"/>
+                  <p:cNvSpPr txBox="1">
+                    <a:spLocks noRot="1" noChangeAspect="1" noMove="1" noResize="1" noEditPoints="1" noAdjustHandles="1" noChangeArrowheads="1" noChangeShapeType="1" noTextEdit="1"/>
+                  </p:cNvSpPr>
+                  <p:nvPr/>
+                </p:nvSpPr>
+                <p:spPr>
+                  <a:xfrm>
+                    <a:off x="1806957" y="2203451"/>
+                    <a:ext cx="373886" cy="369333"/>
+                  </a:xfrm>
+                  <a:prstGeom prst="rect">
+                    <a:avLst/>
+                  </a:prstGeom>
+                  <a:blipFill rotWithShape="0">
+                    <a:blip r:embed="rId2"/>
+                    <a:stretch>
+                      <a:fillRect/>
+                    </a:stretch>
+                  </a:blipFill>
+                </p:spPr>
+                <p:txBody>
+                  <a:bodyPr/>
+                  <a:lstStyle/>
+                  <a:p>
+                    <a:r>
+                      <a:rPr lang="en-US">
+                        <a:noFill/>
+                      </a:rPr>
+                      <a:t> </a:t>
+                    </a:r>
+                  </a:p>
+                </p:txBody>
+              </p:sp>
+            </mc:Fallback>
+          </mc:AlternateContent>
+          <p:cxnSp>
+            <p:nvCxnSpPr>
+              <p:cNvPr id="94" name="Elbow Connector 93"/>
+              <p:cNvCxnSpPr/>
+              <p:nvPr/>
+            </p:nvCxnSpPr>
+            <p:spPr>
+              <a:xfrm flipV="1">
+                <a:off x="2180843" y="2384426"/>
+                <a:ext cx="289306" cy="3692"/>
+              </a:xfrm>
+              <a:prstGeom prst="bentConnector3">
+                <a:avLst>
+                  <a:gd name="adj1" fmla="val 50000"/>
+                </a:avLst>
+              </a:prstGeom>
+              <a:ln w="25400" cap="flat" cmpd="sng">
+                <a:prstDash val="solid"/>
+                <a:miter lim="800000"/>
+                <a:headEnd w="lg" len="lg"/>
+                <a:tailEnd type="triangle" w="lg" len="lg"/>
+              </a:ln>
+            </p:spPr>
+            <p:style>
+              <a:lnRef idx="1">
+                <a:schemeClr val="accent1"/>
+              </a:lnRef>
+              <a:fillRef idx="0">
+                <a:schemeClr val="accent1"/>
+              </a:fillRef>
+              <a:effectRef idx="0">
+                <a:schemeClr val="accent1"/>
+              </a:effectRef>
+              <a:fontRef idx="minor">
+                <a:schemeClr val="tx1"/>
+              </a:fontRef>
+            </p:style>
+          </p:cxnSp>
+          <p:cxnSp>
+            <p:nvCxnSpPr>
+              <p:cNvPr id="96" name="Elbow Connector 95"/>
+              <p:cNvCxnSpPr/>
+              <p:nvPr/>
+            </p:nvCxnSpPr>
+            <p:spPr>
+              <a:xfrm flipV="1">
+                <a:off x="3689348" y="2381767"/>
+                <a:ext cx="352806" cy="2659"/>
+              </a:xfrm>
+              <a:prstGeom prst="bentConnector3">
+                <a:avLst>
+                  <a:gd name="adj1" fmla="val 50000"/>
+                </a:avLst>
+              </a:prstGeom>
+              <a:ln w="25400" cap="flat" cmpd="sng">
+                <a:prstDash val="solid"/>
+                <a:miter lim="800000"/>
+                <a:headEnd w="lg" len="lg"/>
+                <a:tailEnd type="triangle" w="lg" len="lg"/>
+              </a:ln>
+            </p:spPr>
+            <p:style>
+              <a:lnRef idx="1">
+                <a:schemeClr val="accent1"/>
+              </a:lnRef>
+              <a:fillRef idx="0">
+                <a:schemeClr val="accent1"/>
+              </a:fillRef>
+              <a:effectRef idx="0">
+                <a:schemeClr val="accent1"/>
+              </a:effectRef>
+              <a:fontRef idx="minor">
+                <a:schemeClr val="tx1"/>
+              </a:fontRef>
+            </p:style>
+          </p:cxnSp>
+          <p:cxnSp>
+            <p:nvCxnSpPr>
+              <p:cNvPr id="97" name="Elbow Connector 96"/>
+              <p:cNvCxnSpPr/>
+              <p:nvPr/>
+            </p:nvCxnSpPr>
+            <p:spPr>
+              <a:xfrm rot="16200000" flipH="1">
+                <a:off x="2815622" y="1869473"/>
+                <a:ext cx="527051" cy="1204"/>
+              </a:xfrm>
+              <a:prstGeom prst="bentConnector3">
+                <a:avLst>
+                  <a:gd name="adj1" fmla="val 50000"/>
+                </a:avLst>
+              </a:prstGeom>
+              <a:ln w="25400" cap="flat" cmpd="sng">
+                <a:prstDash val="solid"/>
+                <a:miter lim="800000"/>
+                <a:headEnd w="lg" len="lg"/>
+                <a:tailEnd type="triangle" w="lg" len="lg"/>
+              </a:ln>
+            </p:spPr>
+            <p:style>
+              <a:lnRef idx="1">
+                <a:schemeClr val="accent1"/>
+              </a:lnRef>
+              <a:fillRef idx="0">
+                <a:schemeClr val="accent1"/>
+              </a:fillRef>
+              <a:effectRef idx="0">
+                <a:schemeClr val="accent1"/>
+              </a:effectRef>
+              <a:fontRef idx="minor">
+                <a:schemeClr val="tx1"/>
+              </a:fontRef>
+            </p:style>
+          </p:cxnSp>
+          <mc:AlternateContent xmlns:mc="http://schemas.openxmlformats.org/markup-compatibility/2006" xmlns:a14="http://schemas.microsoft.com/office/drawing/2010/main">
+            <mc:Choice Requires="a14">
+              <p:sp>
+                <p:nvSpPr>
+                  <p:cNvPr id="98" name="TextBox 97"/>
+                  <p:cNvSpPr txBox="1"/>
+                  <p:nvPr/>
+                </p:nvSpPr>
+                <p:spPr>
+                  <a:xfrm>
+                    <a:off x="3087628" y="1612126"/>
+                    <a:ext cx="373886" cy="369332"/>
+                  </a:xfrm>
+                  <a:prstGeom prst="rect">
+                    <a:avLst/>
+                  </a:prstGeom>
+                  <a:noFill/>
+                </p:spPr>
+                <p:txBody>
+                  <a:bodyPr wrap="square" rtlCol="0">
+                    <a:spAutoFit/>
+                  </a:bodyPr>
+                  <a:lstStyle/>
+                  <a:p>
+                    <a:pPr/>
+                    <a14:m>
+                      <m:oMathPara xmlns:m="http://schemas.openxmlformats.org/officeDocument/2006/math">
+                        <m:oMathParaPr>
+                          <m:jc m:val="centerGroup"/>
+                        </m:oMathParaPr>
+                        <m:oMath xmlns:m="http://schemas.openxmlformats.org/officeDocument/2006/math">
+                          <m:acc>
+                            <m:accPr>
+                              <m:chr m:val="̂"/>
+                              <m:ctrlPr>
+                                <a:rPr lang="es-ES" b="0" i="1" smtClean="0">
+                                  <a:latin typeface="Cambria Math" charset="0"/>
+                                  <a:ea typeface="Times New Roman" charset="0"/>
+                                  <a:cs typeface="Times New Roman" charset="0"/>
+                                </a:rPr>
+                              </m:ctrlPr>
+                            </m:accPr>
+                            <m:e>
+                              <m:r>
+                                <a:rPr lang="es-ES" b="1">
+                                  <a:latin typeface="Cambria Math" charset="0"/>
+                                  <a:ea typeface="Times New Roman" charset="0"/>
+                                  <a:cs typeface="Times New Roman" charset="0"/>
+                                </a:rPr>
+                                <m:t>𝐰</m:t>
+                              </m:r>
+                            </m:e>
+                          </m:acc>
+                        </m:oMath>
+                      </m:oMathPara>
+                    </a14:m>
+                    <a:endParaRPr lang="en-US" i="1" dirty="0">
+                      <a:latin typeface="Times New Roman" charset="0"/>
+                      <a:ea typeface="Times New Roman" charset="0"/>
+                      <a:cs typeface="Times New Roman" charset="0"/>
+                    </a:endParaRPr>
+                  </a:p>
+                </p:txBody>
+              </p:sp>
+            </mc:Choice>
+            <mc:Fallback xmlns="">
+              <p:sp>
+                <p:nvSpPr>
+                  <p:cNvPr id="98" name="TextBox 97"/>
+                  <p:cNvSpPr txBox="1">
+                    <a:spLocks noRot="1" noChangeAspect="1" noMove="1" noResize="1" noEditPoints="1" noAdjustHandles="1" noChangeArrowheads="1" noChangeShapeType="1" noTextEdit="1"/>
+                  </p:cNvSpPr>
+                  <p:nvPr/>
+                </p:nvSpPr>
+                <p:spPr>
+                  <a:xfrm>
+                    <a:off x="3087628" y="1612126"/>
+                    <a:ext cx="373886" cy="369332"/>
+                  </a:xfrm>
+                  <a:prstGeom prst="rect">
+                    <a:avLst/>
+                  </a:prstGeom>
+                  <a:blipFill rotWithShape="0">
+                    <a:blip r:embed="rId6"/>
+                    <a:stretch>
+                      <a:fillRect t="-1639" r="-9677"/>
+                    </a:stretch>
+                  </a:blipFill>
+                </p:spPr>
+                <p:txBody>
+                  <a:bodyPr/>
+                  <a:lstStyle/>
+                  <a:p>
+                    <a:r>
+                      <a:rPr lang="en-US">
+                        <a:noFill/>
+                      </a:rPr>
+                      <a:t> </a:t>
+                    </a:r>
+                  </a:p>
+                </p:txBody>
+              </p:sp>
+            </mc:Fallback>
+          </mc:AlternateContent>
+        </p:grpSp>
+        <p:pic>
+          <p:nvPicPr>
+            <p:cNvPr id="2" name="Picture 1"/>
+            <p:cNvPicPr>
+              <a:picLocks noChangeAspect="1"/>
+            </p:cNvPicPr>
+            <p:nvPr/>
+          </p:nvPicPr>
+          <p:blipFill>
+            <a:blip r:embed="rId7"/>
+            <a:stretch>
+              <a:fillRect/>
+            </a:stretch>
+          </p:blipFill>
           <p:spPr>
             <a:xfrm>
-              <a:off x="1252481" y="1047735"/>
-              <a:ext cx="506469" cy="501665"/>
-            </a:xfrm>
-            <a:prstGeom prst="can">
-              <a:avLst/>
-            </a:prstGeom>
-            <a:solidFill>
-              <a:schemeClr val="accent2">
-                <a:lumMod val="60000"/>
-                <a:lumOff val="40000"/>
-              </a:schemeClr>
-            </a:solidFill>
-          </p:spPr>
-          <p:style>
-            <a:lnRef idx="2">
-              <a:schemeClr val="accent1">
-                <a:shade val="50000"/>
-              </a:schemeClr>
-            </a:lnRef>
-            <a:fillRef idx="1">
-              <a:schemeClr val="accent1"/>
-            </a:fillRef>
-            <a:effectRef idx="0">
-              <a:schemeClr val="accent1"/>
-            </a:effectRef>
-            <a:fontRef idx="minor">
-              <a:schemeClr val="lt1"/>
-            </a:fontRef>
-          </p:style>
-          <p:txBody>
-            <a:bodyPr rtlCol="0" anchor="ctr"/>
-            <a:lstStyle/>
-            <a:p>
-              <a:pPr algn="ctr"/>
-              <a:r>
-                <a:rPr lang="en-US" dirty="0" smtClean="0">
-                  <a:latin typeface="Apple Chancery" charset="0"/>
-                </a:rPr>
-                <a:t>D</a:t>
-              </a:r>
-              <a:endParaRPr lang="en-US" dirty="0">
-                <a:latin typeface="Apple Chancery" charset="0"/>
-              </a:endParaRPr>
-            </a:p>
-          </p:txBody>
-        </p:sp>
-        <p:sp>
-          <p:nvSpPr>
-            <p:cNvPr id="89" name="Rounded Rectangle 88"/>
-            <p:cNvSpPr/>
-            <p:nvPr/>
-          </p:nvSpPr>
-          <p:spPr>
-            <a:xfrm>
-              <a:off x="2419351" y="990121"/>
-              <a:ext cx="1892299" cy="616429"/>
-            </a:xfrm>
-            <a:prstGeom prst="roundRect">
-              <a:avLst/>
-            </a:prstGeom>
-            <a:solidFill>
-              <a:schemeClr val="accent1">
-                <a:lumMod val="75000"/>
-              </a:schemeClr>
-            </a:solidFill>
-          </p:spPr>
-          <p:style>
-            <a:lnRef idx="2">
-              <a:schemeClr val="accent1">
-                <a:shade val="50000"/>
-              </a:schemeClr>
-            </a:lnRef>
-            <a:fillRef idx="1">
-              <a:schemeClr val="accent1"/>
-            </a:fillRef>
-            <a:effectRef idx="0">
-              <a:schemeClr val="accent1"/>
-            </a:effectRef>
-            <a:fontRef idx="minor">
-              <a:schemeClr val="lt1"/>
-            </a:fontRef>
-          </p:style>
-          <p:txBody>
-            <a:bodyPr rtlCol="0" anchor="ctr"/>
-            <a:lstStyle/>
-            <a:p>
-              <a:pPr algn="ctr"/>
-              <a:r>
-                <a:rPr lang="en-US" dirty="0" smtClean="0"/>
-                <a:t>Parametric model estimation</a:t>
-              </a:r>
-              <a:endParaRPr lang="en-US" dirty="0"/>
-            </a:p>
-          </p:txBody>
-        </p:sp>
-        <p:cxnSp>
-          <p:nvCxnSpPr>
-            <p:cNvPr id="90" name="Elbow Connector 89"/>
-            <p:cNvCxnSpPr/>
-            <p:nvPr/>
-          </p:nvCxnSpPr>
-          <p:spPr>
-            <a:xfrm flipV="1">
-              <a:off x="1758950" y="1298336"/>
-              <a:ext cx="660401" cy="232"/>
-            </a:xfrm>
-            <a:prstGeom prst="bentConnector3">
-              <a:avLst>
-                <a:gd name="adj1" fmla="val 50000"/>
-              </a:avLst>
-            </a:prstGeom>
-            <a:ln w="25400" cap="flat" cmpd="sng">
-              <a:prstDash val="solid"/>
-              <a:miter lim="800000"/>
-              <a:headEnd w="lg" len="lg"/>
-              <a:tailEnd type="triangle" w="lg" len="lg"/>
-            </a:ln>
-          </p:spPr>
-          <p:style>
-            <a:lnRef idx="1">
-              <a:schemeClr val="accent1"/>
-            </a:lnRef>
-            <a:fillRef idx="0">
-              <a:schemeClr val="accent1"/>
-            </a:fillRef>
-            <a:effectRef idx="0">
-              <a:schemeClr val="accent1"/>
-            </a:effectRef>
-            <a:fontRef idx="minor">
-              <a:schemeClr val="tx1"/>
-            </a:fontRef>
-          </p:style>
-        </p:cxnSp>
-        <p:sp>
-          <p:nvSpPr>
-            <p:cNvPr id="91" name="TextBox 90"/>
-            <p:cNvSpPr txBox="1"/>
-            <p:nvPr/>
-          </p:nvSpPr>
-          <p:spPr>
-            <a:xfrm>
-              <a:off x="858014" y="1544422"/>
-              <a:ext cx="1434336" cy="369332"/>
+              <a:off x="4034024" y="3900296"/>
+              <a:ext cx="1710946" cy="840332"/>
             </a:xfrm>
             <a:prstGeom prst="rect">
               <a:avLst/>
             </a:prstGeom>
-            <a:noFill/>
           </p:spPr>
-          <p:txBody>
-            <a:bodyPr wrap="square" rtlCol="0">
-              <a:spAutoFit/>
-            </a:bodyPr>
-            <a:lstStyle/>
-            <a:p>
-              <a:r>
-                <a:rPr lang="en-US" smtClean="0"/>
-                <a:t>Training Data</a:t>
-              </a:r>
-              <a:endParaRPr lang="en-US" dirty="0"/>
-            </a:p>
-          </p:txBody>
-        </p:sp>
-        <p:sp>
-          <p:nvSpPr>
-            <p:cNvPr id="92" name="Rounded Rectangle 91"/>
-            <p:cNvSpPr/>
-            <p:nvPr/>
-          </p:nvSpPr>
-          <p:spPr>
-            <a:xfrm>
-              <a:off x="2470149" y="2133601"/>
-              <a:ext cx="1219199" cy="501649"/>
-            </a:xfrm>
-            <a:prstGeom prst="roundRect">
-              <a:avLst/>
-            </a:prstGeom>
-            <a:solidFill>
-              <a:schemeClr val="accent1">
-                <a:lumMod val="75000"/>
-              </a:schemeClr>
-            </a:solidFill>
-          </p:spPr>
-          <p:style>
-            <a:lnRef idx="2">
-              <a:schemeClr val="accent1">
-                <a:shade val="50000"/>
-              </a:schemeClr>
-            </a:lnRef>
-            <a:fillRef idx="1">
-              <a:schemeClr val="accent1"/>
-            </a:fillRef>
-            <a:effectRef idx="0">
-              <a:schemeClr val="accent1"/>
-            </a:effectRef>
-            <a:fontRef idx="minor">
-              <a:schemeClr val="lt1"/>
-            </a:fontRef>
-          </p:style>
-          <p:txBody>
-            <a:bodyPr rtlCol="0" anchor="ctr"/>
-            <a:lstStyle/>
-            <a:p>
-              <a:pPr algn="ctr"/>
-              <a:r>
-                <a:rPr lang="en-US" smtClean="0"/>
-                <a:t>Predictor</a:t>
-              </a:r>
-              <a:endParaRPr lang="en-US" dirty="0"/>
-            </a:p>
-          </p:txBody>
-        </p:sp>
-        <mc:AlternateContent xmlns:mc="http://schemas.openxmlformats.org/markup-compatibility/2006" xmlns:a14="http://schemas.microsoft.com/office/drawing/2010/main">
-          <mc:Choice Requires="a14">
-            <p:sp>
-              <p:nvSpPr>
-                <p:cNvPr id="93" name="TextBox 92"/>
-                <p:cNvSpPr txBox="1"/>
-                <p:nvPr/>
-              </p:nvSpPr>
-              <p:spPr>
-                <a:xfrm>
-                  <a:off x="1806957" y="2203451"/>
-                  <a:ext cx="373886" cy="369333"/>
-                </a:xfrm>
-                <a:prstGeom prst="rect">
-                  <a:avLst/>
-                </a:prstGeom>
-                <a:noFill/>
-              </p:spPr>
-              <p:txBody>
-                <a:bodyPr wrap="square" rtlCol="0">
-                  <a:spAutoFit/>
-                </a:bodyPr>
-                <a:lstStyle/>
-                <a:p>
-                  <a:pPr/>
-                  <a14:m>
-                    <m:oMathPara xmlns:m="http://schemas.openxmlformats.org/officeDocument/2006/math">
-                      <m:oMathParaPr>
-                        <m:jc m:val="centerGroup"/>
-                      </m:oMathParaPr>
-                      <m:oMath xmlns:m="http://schemas.openxmlformats.org/officeDocument/2006/math">
-                        <m:r>
-                          <a:rPr lang="es-ES" b="1" i="0" smtClean="0">
-                            <a:latin typeface="Cambria Math" charset="0"/>
-                            <a:ea typeface="Times New Roman" charset="0"/>
-                            <a:cs typeface="Times New Roman" charset="0"/>
-                          </a:rPr>
-                          <m:t>𝐱</m:t>
-                        </m:r>
-                      </m:oMath>
-                    </m:oMathPara>
-                  </a14:m>
-                  <a:endParaRPr lang="en-US" b="1" dirty="0">
-                    <a:latin typeface="Times New Roman" charset="0"/>
-                    <a:ea typeface="Times New Roman" charset="0"/>
-                    <a:cs typeface="Times New Roman" charset="0"/>
-                  </a:endParaRPr>
-                </a:p>
-              </p:txBody>
-            </p:sp>
-          </mc:Choice>
-          <mc:Fallback xmlns="">
-            <p:sp>
-              <p:nvSpPr>
-                <p:cNvPr id="93" name="TextBox 92"/>
-                <p:cNvSpPr txBox="1">
-                  <a:spLocks noRot="1" noChangeAspect="1" noMove="1" noResize="1" noEditPoints="1" noAdjustHandles="1" noChangeArrowheads="1" noChangeShapeType="1" noTextEdit="1"/>
-                </p:cNvSpPr>
-                <p:nvPr/>
-              </p:nvSpPr>
-              <p:spPr>
-                <a:xfrm>
-                  <a:off x="1806957" y="2203451"/>
-                  <a:ext cx="373886" cy="369333"/>
-                </a:xfrm>
-                <a:prstGeom prst="rect">
-                  <a:avLst/>
-                </a:prstGeom>
-                <a:blipFill rotWithShape="0">
-                  <a:blip r:embed="rId2"/>
-                  <a:stretch>
-                    <a:fillRect/>
-                  </a:stretch>
-                </a:blipFill>
-              </p:spPr>
-              <p:txBody>
-                <a:bodyPr/>
-                <a:lstStyle/>
-                <a:p>
-                  <a:r>
-                    <a:rPr lang="en-US">
-                      <a:noFill/>
-                    </a:rPr>
-                    <a:t> </a:t>
-                  </a:r>
-                </a:p>
-              </p:txBody>
-            </p:sp>
-          </mc:Fallback>
-        </mc:AlternateContent>
-        <p:cxnSp>
-          <p:nvCxnSpPr>
-            <p:cNvPr id="94" name="Elbow Connector 93"/>
-            <p:cNvCxnSpPr/>
-            <p:nvPr/>
-          </p:nvCxnSpPr>
-          <p:spPr>
-            <a:xfrm flipV="1">
-              <a:off x="2180843" y="2384426"/>
-              <a:ext cx="289306" cy="3692"/>
-            </a:xfrm>
-            <a:prstGeom prst="bentConnector3">
-              <a:avLst>
-                <a:gd name="adj1" fmla="val 50000"/>
-              </a:avLst>
-            </a:prstGeom>
-            <a:ln w="25400" cap="flat" cmpd="sng">
-              <a:prstDash val="solid"/>
-              <a:miter lim="800000"/>
-              <a:headEnd w="lg" len="lg"/>
-              <a:tailEnd type="triangle" w="lg" len="lg"/>
-            </a:ln>
-          </p:spPr>
-          <p:style>
-            <a:lnRef idx="1">
-              <a:schemeClr val="accent1"/>
-            </a:lnRef>
-            <a:fillRef idx="0">
-              <a:schemeClr val="accent1"/>
-            </a:fillRef>
-            <a:effectRef idx="0">
-              <a:schemeClr val="accent1"/>
-            </a:effectRef>
-            <a:fontRef idx="minor">
-              <a:schemeClr val="tx1"/>
-            </a:fontRef>
-          </p:style>
-        </p:cxnSp>
-        <p:cxnSp>
-          <p:nvCxnSpPr>
-            <p:cNvPr id="96" name="Elbow Connector 95"/>
-            <p:cNvCxnSpPr/>
-            <p:nvPr/>
-          </p:nvCxnSpPr>
-          <p:spPr>
-            <a:xfrm flipV="1">
-              <a:off x="3689348" y="2381767"/>
-              <a:ext cx="352806" cy="2659"/>
-            </a:xfrm>
-            <a:prstGeom prst="bentConnector3">
-              <a:avLst>
-                <a:gd name="adj1" fmla="val 50000"/>
-              </a:avLst>
-            </a:prstGeom>
-            <a:ln w="25400" cap="flat" cmpd="sng">
-              <a:prstDash val="solid"/>
-              <a:miter lim="800000"/>
-              <a:headEnd w="lg" len="lg"/>
-              <a:tailEnd type="triangle" w="lg" len="lg"/>
-            </a:ln>
-          </p:spPr>
-          <p:style>
-            <a:lnRef idx="1">
-              <a:schemeClr val="accent1"/>
-            </a:lnRef>
-            <a:fillRef idx="0">
-              <a:schemeClr val="accent1"/>
-            </a:fillRef>
-            <a:effectRef idx="0">
-              <a:schemeClr val="accent1"/>
-            </a:effectRef>
-            <a:fontRef idx="minor">
-              <a:schemeClr val="tx1"/>
-            </a:fontRef>
-          </p:style>
-        </p:cxnSp>
-        <p:cxnSp>
-          <p:nvCxnSpPr>
-            <p:cNvPr id="97" name="Elbow Connector 96"/>
-            <p:cNvCxnSpPr/>
-            <p:nvPr/>
-          </p:nvCxnSpPr>
-          <p:spPr>
-            <a:xfrm rot="16200000" flipH="1">
-              <a:off x="2815622" y="1869473"/>
-              <a:ext cx="527051" cy="1204"/>
-            </a:xfrm>
-            <a:prstGeom prst="bentConnector3">
-              <a:avLst>
-                <a:gd name="adj1" fmla="val 50000"/>
-              </a:avLst>
-            </a:prstGeom>
-            <a:ln w="25400" cap="flat" cmpd="sng">
-              <a:prstDash val="solid"/>
-              <a:miter lim="800000"/>
-              <a:headEnd w="lg" len="lg"/>
-              <a:tailEnd type="triangle" w="lg" len="lg"/>
-            </a:ln>
-          </p:spPr>
-          <p:style>
-            <a:lnRef idx="1">
-              <a:schemeClr val="accent1"/>
-            </a:lnRef>
-            <a:fillRef idx="0">
-              <a:schemeClr val="accent1"/>
-            </a:fillRef>
-            <a:effectRef idx="0">
-              <a:schemeClr val="accent1"/>
-            </a:effectRef>
-            <a:fontRef idx="minor">
-              <a:schemeClr val="tx1"/>
-            </a:fontRef>
-          </p:style>
-        </p:cxnSp>
-        <mc:AlternateContent xmlns:mc="http://schemas.openxmlformats.org/markup-compatibility/2006" xmlns:a14="http://schemas.microsoft.com/office/drawing/2010/main">
-          <mc:Choice Requires="a14">
-            <p:sp>
-              <p:nvSpPr>
-                <p:cNvPr id="98" name="TextBox 97"/>
-                <p:cNvSpPr txBox="1"/>
-                <p:nvPr/>
-              </p:nvSpPr>
-              <p:spPr>
-                <a:xfrm>
-                  <a:off x="3087628" y="1612126"/>
-                  <a:ext cx="373886" cy="369332"/>
-                </a:xfrm>
-                <a:prstGeom prst="rect">
-                  <a:avLst/>
-                </a:prstGeom>
-                <a:noFill/>
-              </p:spPr>
-              <p:txBody>
-                <a:bodyPr wrap="square" rtlCol="0">
-                  <a:spAutoFit/>
-                </a:bodyPr>
-                <a:lstStyle/>
-                <a:p>
-                  <a:pPr/>
-                  <a14:m>
-                    <m:oMathPara xmlns:m="http://schemas.openxmlformats.org/officeDocument/2006/math">
-                      <m:oMathParaPr>
-                        <m:jc m:val="centerGroup"/>
-                      </m:oMathParaPr>
-                      <m:oMath xmlns:m="http://schemas.openxmlformats.org/officeDocument/2006/math">
-                        <m:acc>
-                          <m:accPr>
-                            <m:chr m:val="̂"/>
-                            <m:ctrlPr>
-                              <a:rPr lang="es-ES" b="0" i="1" smtClean="0">
-                                <a:latin typeface="Cambria Math" charset="0"/>
-                                <a:ea typeface="Times New Roman" charset="0"/>
-                                <a:cs typeface="Times New Roman" charset="0"/>
-                              </a:rPr>
-                            </m:ctrlPr>
-                          </m:accPr>
-                          <m:e>
-                            <m:r>
-                              <a:rPr lang="es-ES" b="1">
-                                <a:latin typeface="Cambria Math" charset="0"/>
-                                <a:ea typeface="Times New Roman" charset="0"/>
-                                <a:cs typeface="Times New Roman" charset="0"/>
-                              </a:rPr>
-                              <m:t>𝐰</m:t>
-                            </m:r>
-                          </m:e>
-                        </m:acc>
-                      </m:oMath>
-                    </m:oMathPara>
-                  </a14:m>
-                  <a:endParaRPr lang="en-US" i="1" dirty="0">
-                    <a:latin typeface="Times New Roman" charset="0"/>
-                    <a:ea typeface="Times New Roman" charset="0"/>
-                    <a:cs typeface="Times New Roman" charset="0"/>
-                  </a:endParaRPr>
-                </a:p>
-              </p:txBody>
-            </p:sp>
-          </mc:Choice>
-          <mc:Fallback xmlns="">
-            <p:sp>
-              <p:nvSpPr>
-                <p:cNvPr id="98" name="TextBox 97"/>
-                <p:cNvSpPr txBox="1">
-                  <a:spLocks noRot="1" noChangeAspect="1" noMove="1" noResize="1" noEditPoints="1" noAdjustHandles="1" noChangeArrowheads="1" noChangeShapeType="1" noTextEdit="1"/>
-                </p:cNvSpPr>
-                <p:nvPr/>
-              </p:nvSpPr>
-              <p:spPr>
-                <a:xfrm>
-                  <a:off x="3087628" y="1612126"/>
-                  <a:ext cx="373886" cy="369332"/>
-                </a:xfrm>
-                <a:prstGeom prst="rect">
-                  <a:avLst/>
-                </a:prstGeom>
-                <a:blipFill rotWithShape="0">
-                  <a:blip r:embed="rId6"/>
-                  <a:stretch>
-                    <a:fillRect t="-1639" r="-9677"/>
-                  </a:stretch>
-                </a:blipFill>
-              </p:spPr>
-              <p:txBody>
-                <a:bodyPr/>
-                <a:lstStyle/>
-                <a:p>
-                  <a:r>
-                    <a:rPr lang="en-US">
-                      <a:noFill/>
-                    </a:rPr>
-                    <a:t> </a:t>
-                  </a:r>
-                </a:p>
-              </p:txBody>
-            </p:sp>
-          </mc:Fallback>
-        </mc:AlternateContent>
+        </p:pic>
       </p:grpSp>
-      <p:pic>
-        <p:nvPicPr>
-          <p:cNvPr id="2" name="Picture 1"/>
-          <p:cNvPicPr>
-            <a:picLocks noChangeAspect="1"/>
-          </p:cNvPicPr>
-          <p:nvPr/>
-        </p:nvPicPr>
-        <p:blipFill>
-          <a:blip r:embed="rId7"/>
-          <a:stretch>
-            <a:fillRect/>
-          </a:stretch>
-        </p:blipFill>
-        <p:spPr>
-          <a:xfrm>
-            <a:off x="4023104" y="3756282"/>
-            <a:ext cx="2120900" cy="1041681"/>
-          </a:xfrm>
-          <a:prstGeom prst="rect">
-            <a:avLst/>
-          </a:prstGeom>
-        </p:spPr>
-      </p:pic>
     </p:spTree>
     <p:extLst>
       <p:ext uri="{BB962C8B-B14F-4D97-AF65-F5344CB8AC3E}">

</xml_diff>